<commit_message>
Link to the TG chat
</commit_message>
<xml_diff>
--- a/Presentations/Sirius_TP.pptx
+++ b/Presentations/Sirius_TP.pptx
@@ -214,7 +214,7 @@
           <a:p>
             <a:fld id="{DB3BAF0F-B5C9-6447-A63C-D6A55301FED4}" type="datetimeFigureOut">
               <a:rPr lang="ru-RU" smtClean="0"/>
-              <a:t>21.07.2021</a:t>
+              <a:t>22.07.2021</a:t>
             </a:fld>
             <a:endParaRPr lang="ru-RU"/>
           </a:p>
@@ -628,7 +628,7 @@
           <a:p>
             <a:fld id="{FE51BBD0-5739-C14D-9C15-B9DC1A96F171}" type="datetime1">
               <a:rPr lang="ru-RU" smtClean="0"/>
-              <a:t>21.07.2021</a:t>
+              <a:t>22.07.2021</a:t>
             </a:fld>
             <a:endParaRPr lang="ru-RU"/>
           </a:p>
@@ -826,7 +826,7 @@
           <a:p>
             <a:fld id="{1CBA792D-A3E6-164D-A883-0471A3ECB0E6}" type="datetime1">
               <a:rPr lang="ru-RU" smtClean="0"/>
-              <a:t>21.07.2021</a:t>
+              <a:t>22.07.2021</a:t>
             </a:fld>
             <a:endParaRPr lang="ru-RU"/>
           </a:p>
@@ -1034,7 +1034,7 @@
           <a:p>
             <a:fld id="{80708D9C-3A9C-FC44-B58A-1C08A2ACA2B4}" type="datetime1">
               <a:rPr lang="ru-RU" smtClean="0"/>
-              <a:t>21.07.2021</a:t>
+              <a:t>22.07.2021</a:t>
             </a:fld>
             <a:endParaRPr lang="ru-RU"/>
           </a:p>
@@ -1232,7 +1232,7 @@
           <a:p>
             <a:fld id="{1ADE427B-B833-D84D-8FC0-0C889C8CBFC5}" type="datetime1">
               <a:rPr lang="ru-RU" smtClean="0"/>
-              <a:t>21.07.2021</a:t>
+              <a:t>22.07.2021</a:t>
             </a:fld>
             <a:endParaRPr lang="ru-RU"/>
           </a:p>
@@ -1507,7 +1507,7 @@
           <a:p>
             <a:fld id="{B9C011FF-FCAE-B645-BB41-53C22E03B7CE}" type="datetime1">
               <a:rPr lang="ru-RU" smtClean="0"/>
-              <a:t>21.07.2021</a:t>
+              <a:t>22.07.2021</a:t>
             </a:fld>
             <a:endParaRPr lang="ru-RU"/>
           </a:p>
@@ -1772,7 +1772,7 @@
           <a:p>
             <a:fld id="{80941C29-DE51-744D-83B5-4F0D431C8551}" type="datetime1">
               <a:rPr lang="ru-RU" smtClean="0"/>
-              <a:t>21.07.2021</a:t>
+              <a:t>22.07.2021</a:t>
             </a:fld>
             <a:endParaRPr lang="ru-RU"/>
           </a:p>
@@ -2184,7 +2184,7 @@
           <a:p>
             <a:fld id="{1F63CAE3-997F-034F-983B-CECC8FB7B519}" type="datetime1">
               <a:rPr lang="ru-RU" smtClean="0"/>
-              <a:t>21.07.2021</a:t>
+              <a:t>22.07.2021</a:t>
             </a:fld>
             <a:endParaRPr lang="ru-RU"/>
           </a:p>
@@ -2325,7 +2325,7 @@
           <a:p>
             <a:fld id="{31019527-992C-D445-9AE2-5740E117DEBB}" type="datetime1">
               <a:rPr lang="ru-RU" smtClean="0"/>
-              <a:t>21.07.2021</a:t>
+              <a:t>22.07.2021</a:t>
             </a:fld>
             <a:endParaRPr lang="ru-RU"/>
           </a:p>
@@ -2438,7 +2438,7 @@
           <a:p>
             <a:fld id="{F1533E43-D90D-AE49-8C0D-9AF45FEE0F5A}" type="datetime1">
               <a:rPr lang="ru-RU" smtClean="0"/>
-              <a:t>21.07.2021</a:t>
+              <a:t>22.07.2021</a:t>
             </a:fld>
             <a:endParaRPr lang="ru-RU"/>
           </a:p>
@@ -2749,7 +2749,7 @@
           <a:p>
             <a:fld id="{A69F1E9A-6F05-114F-A8DB-353BE7288864}" type="datetime1">
               <a:rPr lang="ru-RU" smtClean="0"/>
-              <a:t>21.07.2021</a:t>
+              <a:t>22.07.2021</a:t>
             </a:fld>
             <a:endParaRPr lang="ru-RU"/>
           </a:p>
@@ -3037,7 +3037,7 @@
           <a:p>
             <a:fld id="{3E18A120-F3F1-E24D-9A7F-D76008A88DD8}" type="datetime1">
               <a:rPr lang="ru-RU" smtClean="0"/>
-              <a:t>21.07.2021</a:t>
+              <a:t>22.07.2021</a:t>
             </a:fld>
             <a:endParaRPr lang="ru-RU"/>
           </a:p>
@@ -3278,7 +3278,7 @@
           <a:p>
             <a:fld id="{E5BCC170-917E-1142-B3D9-A17882F4B44E}" type="datetime1">
               <a:rPr lang="ru-RU" smtClean="0"/>
-              <a:t>21.07.2021</a:t>
+              <a:t>22.07.2021</a:t>
             </a:fld>
             <a:endParaRPr lang="ru-RU"/>
           </a:p>
@@ -17600,7 +17600,6 @@
               <a:rPr lang="en-US" b="1" dirty="0"/>
               <a:t>How it will be</a:t>
             </a:r>
-            <a:endParaRPr lang="en-US" b="1" dirty="0"/>
           </a:p>
         </p:txBody>
       </p:sp>
@@ -18155,16 +18154,7 @@
               <a:rPr lang="en-US" dirty="0" smtClean="0"/>
               <a:t> </a:t>
             </a:r>
-          </a:p>
-          <a:p>
-            <a:pPr lvl="1"/>
-            <a:r>
-              <a:rPr lang="en-US" dirty="0" smtClean="0"/>
-              <a:t>Telegram: @ Not for the GitHub version</a:t>
-            </a:r>
-          </a:p>
-          <a:p>
-            <a:endParaRPr lang="en-US" dirty="0"/>
+            <a:endParaRPr lang="en-US" dirty="0" smtClean="0"/>
           </a:p>
           <a:p>
             <a:r>
@@ -18184,7 +18174,11 @@
             <a:pPr lvl="1"/>
             <a:r>
               <a:rPr lang="en-US" dirty="0" smtClean="0"/>
-              <a:t>From the July 29</a:t>
+              <a:t>From </a:t>
+            </a:r>
+            <a:r>
+              <a:rPr lang="en-US" dirty="0" smtClean="0"/>
+              <a:t>the July 29</a:t>
             </a:r>
             <a:r>
               <a:rPr lang="en-US" baseline="30000" dirty="0" smtClean="0"/>
@@ -18196,20 +18190,46 @@
             </a:r>
           </a:p>
           <a:p>
+            <a:r>
+              <a:rPr lang="en-US" dirty="0" smtClean="0"/>
+              <a:t>Chat of the challenge</a:t>
+            </a:r>
+            <a:endParaRPr lang="en-US" dirty="0"/>
+          </a:p>
+          <a:p>
             <a:pPr lvl="1"/>
             <a:r>
+              <a:rPr lang="en-US" dirty="0" smtClean="0">
+                <a:hlinkClick r:id="rId2"/>
+              </a:rPr>
+              <a:t>https://t.me/joinchat/Km7p_wYqHcU3MGFi</a:t>
+            </a:r>
+            <a:endParaRPr lang="en-US" dirty="0" smtClean="0"/>
+          </a:p>
+          <a:p>
+            <a:r>
               <a:rPr lang="en-US" dirty="0" smtClean="0"/>
-              <a:t>Telegram: </a:t>
-            </a:r>
-            <a:r>
-              <a:rPr lang="en-US" dirty="0"/>
-              <a:t>@ Not for the GitHub version</a:t>
-            </a:r>
-          </a:p>
-          <a:p>
-            <a:pPr marL="457200" lvl="1" indent="0">
-              <a:buNone/>
-            </a:pPr>
+              <a:t>News of the challenge</a:t>
+            </a:r>
+          </a:p>
+          <a:p>
+            <a:pPr lvl="1"/>
+            <a:r>
+              <a:rPr lang="en-US" dirty="0">
+                <a:hlinkClick r:id="rId3"/>
+              </a:rPr>
+              <a:t>https://</a:t>
+            </a:r>
+            <a:r>
+              <a:rPr lang="en-US" dirty="0" smtClean="0">
+                <a:hlinkClick r:id="rId3"/>
+              </a:rPr>
+              <a:t>t.me/joinchat/GewH2zFxBpYyZGRi</a:t>
+            </a:r>
+            <a:r>
+              <a:rPr lang="en-US" dirty="0" smtClean="0"/>
+              <a:t> </a:t>
+            </a:r>
             <a:endParaRPr lang="en-US" dirty="0"/>
           </a:p>
         </p:txBody>
@@ -18258,7 +18278,7 @@
           <p:nvPr/>
         </p:nvPicPr>
         <p:blipFill>
-          <a:blip r:embed="rId2"/>
+          <a:blip r:embed="rId4"/>
           <a:stretch>
             <a:fillRect/>
           </a:stretch>
@@ -18267,6 +18287,30 @@
           <a:xfrm>
             <a:off x="0" y="0"/>
             <a:ext cx="1564101" cy="405705"/>
+          </a:xfrm>
+          <a:prstGeom prst="rect">
+            <a:avLst/>
+          </a:prstGeom>
+        </p:spPr>
+      </p:pic>
+      <p:pic>
+        <p:nvPicPr>
+          <p:cNvPr id="4" name="Рисунок 3"/>
+          <p:cNvPicPr>
+            <a:picLocks noChangeAspect="1"/>
+          </p:cNvPicPr>
+          <p:nvPr/>
+        </p:nvPicPr>
+        <p:blipFill>
+          <a:blip r:embed="rId5"/>
+          <a:stretch>
+            <a:fillRect/>
+          </a:stretch>
+        </p:blipFill>
+        <p:spPr>
+          <a:xfrm>
+            <a:off x="7861005" y="2555469"/>
+            <a:ext cx="2531436" cy="2371345"/>
           </a:xfrm>
           <a:prstGeom prst="rect">
             <a:avLst/>

</xml_diff>